<commit_message>
Updated the intro of the presentation.
</commit_message>
<xml_diff>
--- a/docs/presentations/presentation_1.pptx
+++ b/docs/presentations/presentation_1.pptx
@@ -223,7 +223,7 @@
           <a:p>
             <a:fld id="{D1CB9CF0-A540-4793-A5F3-F4917CFDDCB6}" type="datetimeFigureOut">
               <a:rPr lang="en-US" smtClean="0"/>
-              <a:t>1/30/2020</a:t>
+              <a:t>2/4/2020</a:t>
             </a:fld>
             <a:endParaRPr lang="en-US" dirty="0"/>
           </a:p>
@@ -400,7 +400,7 @@
           <a:p>
             <a:fld id="{EDA03753-A5BE-4D79-AEA9-C0A65A6F8851}" type="datetimeFigureOut">
               <a:rPr lang="en-US" smtClean="0"/>
-              <a:t>1/30/2020</a:t>
+              <a:t>2/4/2020</a:t>
             </a:fld>
             <a:endParaRPr lang="en-US" dirty="0"/>
           </a:p>
@@ -10431,11 +10431,23 @@
             <p:ph type="title"/>
           </p:nvPr>
         </p:nvSpPr>
-        <p:spPr/>
+        <p:spPr>
+          <a:xfrm>
+            <a:off x="957942" y="1420426"/>
+            <a:ext cx="5138057" cy="506678"/>
+          </a:xfrm>
+        </p:spPr>
         <p:txBody>
-          <a:bodyPr/>
+          <a:bodyPr>
+            <a:noAutofit/>
+          </a:bodyPr>
           <a:lstStyle/>
           <a:p>
+            <a:pPr>
+              <a:lnSpc>
+                <a:spcPct val="100000"/>
+              </a:lnSpc>
+            </a:pPr>
             <a:r>
               <a:rPr lang="en-US" dirty="0"/>
               <a:t>What is it?</a:t>
@@ -10464,9 +10476,14 @@
           <a:bodyPr/>
           <a:lstStyle/>
           <a:p>
-            <a:r>
-              <a:rPr lang="en-US" dirty="0"/>
-              <a:t>Lorem ipsum dolor sit amet, consectetur adipiscing elit. Ut gravida eros erat. Proin a tellus sed risus lobortis sagittis eu quis est. Duis ut aliquam nisi. Suspendisse vehicula mi diam, sit amet lacinia massa sodales ac. Fusce condimentum egestas nunc a maximus. Quisque et orci purus. Proin dolor mi, ultrices sit amet ipsum placerat, congue mattis turpis. Donec vestibulum eros eget mauris dignissim, ut ultricies dolor viverra. </a:t>
+            <a:pPr algn="just">
+              <a:lnSpc>
+                <a:spcPct val="100000"/>
+              </a:lnSpc>
+            </a:pPr>
+            <a:r>
+              <a:rPr lang="en-US" sz="2000" dirty="0"/>
+              <a:t>Featurama is a social networking application that marries the friend system of Facebook to the board creation features of Pinterest and the silo features of Reddit. It allows users to only focus on what they are interested in and not be concerned with what their friends are eating or what their friend’s kids are doing. Unless you are into that stuff, then you can have children and food as interests and do that. Weirdo.</a:t>
             </a:r>
           </a:p>
           <a:p>
@@ -10820,34 +10837,6 @@
       </p:sp>
       <p:sp>
         <p:nvSpPr>
-          <p:cNvPr id="9" name="Text Placeholder 8">
-            <a:extLst>
-              <a:ext uri="{FF2B5EF4-FFF2-40B4-BE49-F238E27FC236}">
-                <a16:creationId xmlns:a16="http://schemas.microsoft.com/office/drawing/2014/main" id="{4744B28E-5E14-4A77-AD4F-C979905862BF}"/>
-              </a:ext>
-            </a:extLst>
-          </p:cNvPr>
-          <p:cNvSpPr>
-            <a:spLocks noGrp="1"/>
-          </p:cNvSpPr>
-          <p:nvPr>
-            <p:ph type="body" idx="13"/>
-          </p:nvPr>
-        </p:nvSpPr>
-        <p:spPr/>
-        <p:txBody>
-          <a:bodyPr/>
-          <a:lstStyle/>
-          <a:p>
-            <a:r>
-              <a:rPr lang="en-US" dirty="0"/>
-              <a:t>SUBTITLE GOES HERE</a:t>
-            </a:r>
-          </a:p>
-        </p:txBody>
-      </p:sp>
-      <p:sp>
-        <p:nvSpPr>
           <p:cNvPr id="4" name="Content Placeholder 3">
             <a:extLst>
               <a:ext uri="{FF2B5EF4-FFF2-40B4-BE49-F238E27FC236}">
@@ -10865,75 +10854,20 @@
         <p:spPr/>
         <p:txBody>
           <a:bodyPr>
-            <a:normAutofit lnSpcReduction="10000"/>
+            <a:noAutofit/>
           </a:bodyPr>
           <a:lstStyle/>
           <a:p>
-            <a:pPr marL="0" indent="0">
+            <a:pPr marL="0" indent="0" algn="just">
+              <a:lnSpc>
+                <a:spcPct val="100000"/>
+              </a:lnSpc>
               <a:buNone/>
             </a:pPr>
             <a:r>
-              <a:rPr lang="en-US" dirty="0"/>
-              <a:t>Lorem ipsum dolor sit amet, consectetur adipiscing elit. Ut gravida eros erat. Proin a tellus sed risus lobortis sagittis eu quis est. Duis ut aliquam nisi. Suspendisse vehicula mi diam, sit amet lacinia massa sodales ac. Fusce condimentum egestas nunc a maximus. Quisque et orci purus. Proin dolor mi, ultrices sit amet ipsum placerat, congue mattis turpis. Donec vestibulum eros eget mauris dignissim, ut ultricies dolor vi Lorem ipsum dolor sit amet, consectetur adipiscing elit. Ut gravida eros erat. Proin a tellus sed risus lobortis sagittis eu quis est. Duis ut aliquam nisi. Suspendisse vehicula mi diam, sit amet lacinia massa sodales ac. Fusce condimentum egestas nunc a maximus. </a:t>
-            </a:r>
-          </a:p>
-        </p:txBody>
-      </p:sp>
-      <p:sp>
-        <p:nvSpPr>
-          <p:cNvPr id="2" name="Footer Placeholder 1">
-            <a:extLst>
-              <a:ext uri="{FF2B5EF4-FFF2-40B4-BE49-F238E27FC236}">
-                <a16:creationId xmlns:a16="http://schemas.microsoft.com/office/drawing/2014/main" id="{80919F81-09E4-41AD-9E45-21C8A7FBC2E5}"/>
-              </a:ext>
-            </a:extLst>
-          </p:cNvPr>
-          <p:cNvSpPr>
-            <a:spLocks noGrp="1"/>
-          </p:cNvSpPr>
-          <p:nvPr>
-            <p:ph type="ftr" sz="quarter" idx="16"/>
-          </p:nvPr>
-        </p:nvSpPr>
-        <p:spPr/>
-        <p:txBody>
-          <a:bodyPr/>
-          <a:lstStyle/>
-          <a:p>
-            <a:r>
-              <a:rPr lang="en-US" dirty="0"/>
-              <a:t>Add a Footer</a:t>
-            </a:r>
-          </a:p>
-        </p:txBody>
-      </p:sp>
-      <p:sp>
-        <p:nvSpPr>
-          <p:cNvPr id="3" name="Slide Number Placeholder 2">
-            <a:extLst>
-              <a:ext uri="{FF2B5EF4-FFF2-40B4-BE49-F238E27FC236}">
-                <a16:creationId xmlns:a16="http://schemas.microsoft.com/office/drawing/2014/main" id="{6556A3C9-6740-4558-AB5B-687741A63BDD}"/>
-              </a:ext>
-            </a:extLst>
-          </p:cNvPr>
-          <p:cNvSpPr>
-            <a:spLocks noGrp="1"/>
-          </p:cNvSpPr>
-          <p:nvPr>
-            <p:ph type="sldNum" sz="quarter" idx="17"/>
-          </p:nvPr>
-        </p:nvSpPr>
-        <p:spPr/>
-        <p:txBody>
-          <a:bodyPr/>
-          <a:lstStyle/>
-          <a:p>
-            <a:fld id="{8C2E478F-E849-4A8C-AF1F-CBCC78A7CBFA}" type="slidenum">
-              <a:rPr lang="en-US" smtClean="0"/>
-              <a:pPr/>
-              <a:t>3</a:t>
-            </a:fld>
-            <a:endParaRPr lang="en-US" dirty="0"/>
+              <a:rPr lang="en-US" sz="2000" dirty="0"/>
+              <a:t>We envision a future in which the Internet caters to the individual. Instead of you chasing down your news, interests, hobbies, friends, etc., the Internet should bring all of that to you on your personal webpage. Imagine waking up in the morning and turning on your phone and instead of going to Discord, New York Times, Facebook, etc. it all came to you? Many of us have already digitized most of our lives with fitness apps, calendars, books, Netflix, blogs, etc. Why chase all of those things down when they can all come to you in one seamless application?</a:t>
+            </a:r>
           </a:p>
         </p:txBody>
       </p:sp>
@@ -10985,12 +10919,14 @@
         </p:nvSpPr>
         <p:spPr/>
         <p:txBody>
-          <a:bodyPr/>
+          <a:bodyPr>
+            <a:normAutofit/>
+          </a:bodyPr>
           <a:lstStyle/>
           <a:p>
             <a:r>
-              <a:rPr lang="en-US" dirty="0"/>
-              <a:t>How?</a:t>
+              <a:rPr lang="en-US" sz="3200" dirty="0"/>
+              <a:t>How</a:t>
             </a:r>
           </a:p>
         </p:txBody>
@@ -11013,23 +10949,40 @@
         </p:nvSpPr>
         <p:spPr/>
         <p:txBody>
-          <a:bodyPr/>
+          <a:bodyPr>
+            <a:noAutofit/>
+          </a:bodyPr>
           <a:lstStyle/>
           <a:p>
-            <a:r>
-              <a:rPr lang="en-US" dirty="0"/>
+            <a:pPr>
+              <a:lnSpc>
+                <a:spcPct val="100000"/>
+              </a:lnSpc>
+            </a:pPr>
+            <a:r>
+              <a:rPr lang="en-US" sz="2000" dirty="0"/>
               <a:t>Lorem ipsum dolor sit amet, consectetur adipiscing elit. Ut gravida eros erat. </a:t>
             </a:r>
           </a:p>
           <a:p>
-            <a:r>
-              <a:rPr lang="en-US" dirty="0"/>
+            <a:pPr>
+              <a:lnSpc>
+                <a:spcPct val="100000"/>
+              </a:lnSpc>
+            </a:pPr>
+            <a:r>
+              <a:rPr lang="en-US" sz="2000" dirty="0"/>
               <a:t>Proin a tellus sed risus lobortis sagittis eu quis est. Duis ut aliquam nisi. Suspendisse vehicula mi diam, </a:t>
             </a:r>
           </a:p>
           <a:p>
-            <a:r>
-              <a:rPr lang="en-US" dirty="0"/>
+            <a:pPr>
+              <a:lnSpc>
+                <a:spcPct val="100000"/>
+              </a:lnSpc>
+            </a:pPr>
+            <a:r>
+              <a:rPr lang="en-US" sz="2000" dirty="0"/>
               <a:t>sit amet lacinia massa sodales ac. Fusce condimentum egestas nunc a  </a:t>
             </a:r>
           </a:p>
@@ -11084,12 +11037,14 @@
         </p:nvSpPr>
         <p:spPr/>
         <p:txBody>
-          <a:bodyPr/>
+          <a:bodyPr>
+            <a:normAutofit/>
+          </a:bodyPr>
           <a:lstStyle/>
           <a:p>
             <a:r>
-              <a:rPr lang="en-US" dirty="0"/>
-              <a:t>Functionality?</a:t>
+              <a:rPr lang="en-US" sz="3200" dirty="0"/>
+              <a:t>Functionality</a:t>
             </a:r>
           </a:p>
         </p:txBody>
@@ -11112,83 +11067,42 @@
         </p:nvSpPr>
         <p:spPr/>
         <p:txBody>
-          <a:bodyPr/>
+          <a:bodyPr>
+            <a:noAutofit/>
+          </a:bodyPr>
           <a:lstStyle/>
           <a:p>
-            <a:r>
-              <a:rPr lang="en-US" dirty="0"/>
+            <a:pPr>
+              <a:lnSpc>
+                <a:spcPct val="100000"/>
+              </a:lnSpc>
+            </a:pPr>
+            <a:r>
+              <a:rPr lang="en-US" sz="2000" dirty="0"/>
               <a:t>Lorem ipsum dolor sit amet, consectetur adipiscing elit. Ut gravida eros erat. </a:t>
             </a:r>
           </a:p>
           <a:p>
-            <a:r>
-              <a:rPr lang="en-US" dirty="0"/>
+            <a:pPr>
+              <a:lnSpc>
+                <a:spcPct val="100000"/>
+              </a:lnSpc>
+            </a:pPr>
+            <a:r>
+              <a:rPr lang="en-US" sz="2000" dirty="0"/>
               <a:t>Proin a tellus sed risus lobortis sagittis eu quis est. Duis ut aliquam nisi. Suspendisse vehicula mi diam, </a:t>
             </a:r>
           </a:p>
           <a:p>
-            <a:r>
-              <a:rPr lang="en-US" dirty="0"/>
+            <a:pPr>
+              <a:lnSpc>
+                <a:spcPct val="100000"/>
+              </a:lnSpc>
+            </a:pPr>
+            <a:r>
+              <a:rPr lang="en-US" sz="2000" dirty="0"/>
               <a:t>sit amet lacinia massa sodales ac. Fusce condimentum egestas nunc a</a:t>
             </a:r>
-          </a:p>
-        </p:txBody>
-      </p:sp>
-      <p:sp>
-        <p:nvSpPr>
-          <p:cNvPr id="2" name="Footer Placeholder 1">
-            <a:extLst>
-              <a:ext uri="{FF2B5EF4-FFF2-40B4-BE49-F238E27FC236}">
-                <a16:creationId xmlns:a16="http://schemas.microsoft.com/office/drawing/2014/main" id="{5483E2DD-4F96-4CE8-A9FE-FD5DF44C4CAC}"/>
-              </a:ext>
-            </a:extLst>
-          </p:cNvPr>
-          <p:cNvSpPr>
-            <a:spLocks noGrp="1"/>
-          </p:cNvSpPr>
-          <p:nvPr>
-            <p:ph type="ftr" sz="quarter" idx="16"/>
-          </p:nvPr>
-        </p:nvSpPr>
-        <p:spPr/>
-        <p:txBody>
-          <a:bodyPr/>
-          <a:lstStyle/>
-          <a:p>
-            <a:r>
-              <a:rPr lang="en-US" dirty="0"/>
-              <a:t>Add a Footer</a:t>
-            </a:r>
-          </a:p>
-        </p:txBody>
-      </p:sp>
-      <p:sp>
-        <p:nvSpPr>
-          <p:cNvPr id="16" name="Slide Number Placeholder 15">
-            <a:extLst>
-              <a:ext uri="{FF2B5EF4-FFF2-40B4-BE49-F238E27FC236}">
-                <a16:creationId xmlns:a16="http://schemas.microsoft.com/office/drawing/2014/main" id="{7EF05482-0999-42B8-A27E-59AAA26FB58E}"/>
-              </a:ext>
-            </a:extLst>
-          </p:cNvPr>
-          <p:cNvSpPr>
-            <a:spLocks noGrp="1"/>
-          </p:cNvSpPr>
-          <p:nvPr>
-            <p:ph type="sldNum" sz="quarter" idx="17"/>
-          </p:nvPr>
-        </p:nvSpPr>
-        <p:spPr/>
-        <p:txBody>
-          <a:bodyPr/>
-          <a:lstStyle/>
-          <a:p>
-            <a:fld id="{8C2E478F-E849-4A8C-AF1F-CBCC78A7CBFA}" type="slidenum">
-              <a:rPr lang="en-US" smtClean="0"/>
-              <a:pPr/>
-              <a:t>4</a:t>
-            </a:fld>
-            <a:endParaRPr lang="en-US" dirty="0"/>
           </a:p>
         </p:txBody>
       </p:sp>
@@ -11297,16 +11211,35 @@
         <p:spPr/>
         <p:txBody>
           <a:bodyPr>
-            <a:normAutofit fontScale="85000" lnSpcReduction="10000"/>
+            <a:noAutofit/>
           </a:bodyPr>
           <a:lstStyle/>
           <a:p>
             <a:pPr marL="0" indent="0">
+              <a:lnSpc>
+                <a:spcPct val="100000"/>
+              </a:lnSpc>
               <a:buNone/>
             </a:pPr>
             <a:r>
-              <a:rPr lang="en-US" dirty="0"/>
-              <a:t>Lorem ipsum dolor sit amet, consectetur adipiscing elit. Ut gravida eros erat. Proin a tellus sed ri sus lobortis sagittis eu quis est. Duis ut aliquam nisi. Suspendisse vehicula mi diam, sit amet lacinia massa sodales ac. Fusce condimentum egestas nunc a maximus. Quisque et orci purus. Proin dolor mi, ultrices sit amet ipsum placerat, congue mattis turpis. Donec vestibulum eros eget mauris dignissim, ut ultricies dolor viverra. Phasellus efficitur ante nec sem convallis, in ornare est accumsan. Lorem ipsum dolor sit amet, consectetur adipiscing elit. Ut gravida eros erat. Proin a tellus sed risus lobortis sagittis eu quis est. </a:t>
+              <a:rPr lang="en-US" sz="2000" dirty="0"/>
+              <a:t>Lorem ipsum dolor sit amet, consectetur adipiscing elit. Ut gravida eros erat. Proin a tellus sed ri sus lobortis sagittis eu quis est. Duis ut aliquam nisi. Suspendisse vehicula mi diam, sit amet lacinia massa sodales ac. Fusce condimentum egestas nunc a maximus. Quisque et orci purus. Proin dolor mi, ultrices sit amet ipsum placerat, congue mattis turpis. Donec vestibulum eros eget mauris dignissim, </a:t>
+            </a:r>
+            <a:r>
+              <a:rPr lang="en-US" sz="2000" dirty="0" err="1"/>
+              <a:t>ut</a:t>
+            </a:r>
+            <a:r>
+              <a:rPr lang="en-US" sz="2000" dirty="0"/>
+              <a:t> </a:t>
+            </a:r>
+            <a:r>
+              <a:rPr lang="en-US" sz="2000" dirty="0" err="1"/>
+              <a:t>ultricies</a:t>
+            </a:r>
+            <a:r>
+              <a:rPr lang="en-US" sz="2000" dirty="0"/>
+              <a:t>.</a:t>
             </a:r>
           </a:p>
         </p:txBody>
@@ -11479,29 +11412,51 @@
         </p:nvSpPr>
         <p:spPr/>
         <p:txBody>
-          <a:bodyPr/>
+          <a:bodyPr>
+            <a:normAutofit/>
+          </a:bodyPr>
           <a:lstStyle/>
           <a:p>
-            <a:r>
-              <a:rPr lang="en-US" dirty="0"/>
+            <a:pPr>
+              <a:lnSpc>
+                <a:spcPct val="100000"/>
+              </a:lnSpc>
+            </a:pPr>
+            <a:r>
+              <a:rPr lang="en-US" sz="2000" dirty="0"/>
               <a:t>Material UI</a:t>
             </a:r>
           </a:p>
           <a:p>
-            <a:r>
-              <a:rPr lang="en-US" dirty="0"/>
+            <a:pPr>
+              <a:lnSpc>
+                <a:spcPct val="100000"/>
+              </a:lnSpc>
+            </a:pPr>
+            <a:r>
+              <a:rPr lang="en-US" sz="2000" dirty="0"/>
               <a:t>Dynamic</a:t>
             </a:r>
           </a:p>
           <a:p>
-            <a:r>
-              <a:rPr lang="en-US" dirty="0"/>
+            <a:pPr>
+              <a:lnSpc>
+                <a:spcPct val="100000"/>
+              </a:lnSpc>
+            </a:pPr>
+            <a:r>
+              <a:rPr lang="en-US" sz="2000" dirty="0"/>
               <a:t>Responsive</a:t>
             </a:r>
           </a:p>
           <a:p>
-            <a:r>
-              <a:rPr lang="en-US" dirty="0"/>
+            <a:pPr>
+              <a:lnSpc>
+                <a:spcPct val="100000"/>
+              </a:lnSpc>
+            </a:pPr>
+            <a:r>
+              <a:rPr lang="en-US" sz="2000" dirty="0"/>
               <a:t>Etc.</a:t>
             </a:r>
           </a:p>
@@ -11555,11 +11510,13 @@
         </p:nvSpPr>
         <p:spPr/>
         <p:txBody>
-          <a:bodyPr/>
+          <a:bodyPr>
+            <a:normAutofit/>
+          </a:bodyPr>
           <a:lstStyle/>
           <a:p>
             <a:r>
-              <a:rPr lang="en-US" dirty="0"/>
+              <a:rPr lang="en-US" sz="3200" dirty="0"/>
               <a:t>Backend</a:t>
             </a:r>
           </a:p>
@@ -13495,11 +13452,18 @@
         </p:nvSpPr>
         <p:spPr/>
         <p:txBody>
-          <a:bodyPr/>
+          <a:bodyPr>
+            <a:normAutofit/>
+          </a:bodyPr>
           <a:lstStyle/>
           <a:p>
-            <a:r>
-              <a:rPr lang="en-US" dirty="0"/>
+            <a:pPr>
+              <a:lnSpc>
+                <a:spcPct val="100000"/>
+              </a:lnSpc>
+            </a:pPr>
+            <a:r>
+              <a:rPr lang="en-US" sz="2000" dirty="0"/>
               <a:t>Mongo DB</a:t>
             </a:r>
           </a:p>
@@ -13523,12 +13487,14 @@
         </p:nvSpPr>
         <p:spPr/>
         <p:txBody>
-          <a:bodyPr/>
+          <a:bodyPr>
+            <a:normAutofit/>
+          </a:bodyPr>
           <a:lstStyle/>
           <a:p>
             <a:r>
-              <a:rPr lang="en-US" dirty="0"/>
-              <a:t>Schema Time</a:t>
+              <a:rPr lang="en-US" sz="3200" dirty="0"/>
+              <a:t>Schema</a:t>
             </a:r>
           </a:p>
         </p:txBody>
@@ -13551,35 +13517,62 @@
         </p:nvSpPr>
         <p:spPr/>
         <p:txBody>
-          <a:bodyPr/>
+          <a:bodyPr>
+            <a:normAutofit/>
+          </a:bodyPr>
           <a:lstStyle/>
           <a:p>
-            <a:r>
-              <a:rPr lang="en-US" dirty="0"/>
+            <a:pPr>
+              <a:lnSpc>
+                <a:spcPct val="100000"/>
+              </a:lnSpc>
+            </a:pPr>
+            <a:r>
+              <a:rPr lang="en-US" sz="2000" dirty="0"/>
               <a:t>Users</a:t>
             </a:r>
           </a:p>
           <a:p>
-            <a:r>
-              <a:rPr lang="en-US" dirty="0"/>
+            <a:pPr>
+              <a:lnSpc>
+                <a:spcPct val="100000"/>
+              </a:lnSpc>
+            </a:pPr>
+            <a:r>
+              <a:rPr lang="en-US" sz="2000" dirty="0"/>
               <a:t>Posts</a:t>
             </a:r>
           </a:p>
           <a:p>
-            <a:r>
-              <a:rPr lang="en-US" dirty="0"/>
+            <a:pPr>
+              <a:lnSpc>
+                <a:spcPct val="100000"/>
+              </a:lnSpc>
+            </a:pPr>
+            <a:r>
+              <a:rPr lang="en-US" sz="2000" dirty="0"/>
               <a:t>Comments</a:t>
             </a:r>
           </a:p>
           <a:p>
-            <a:r>
-              <a:rPr lang="en-US" dirty="0"/>
+            <a:pPr>
+              <a:lnSpc>
+                <a:spcPct val="100000"/>
+              </a:lnSpc>
+            </a:pPr>
+            <a:r>
+              <a:rPr lang="en-US" sz="2000" dirty="0"/>
               <a:t>Lists</a:t>
             </a:r>
           </a:p>
           <a:p>
-            <a:r>
-              <a:rPr lang="en-US" dirty="0"/>
+            <a:pPr>
+              <a:lnSpc>
+                <a:spcPct val="100000"/>
+              </a:lnSpc>
+            </a:pPr>
+            <a:r>
+              <a:rPr lang="en-US" sz="2000" dirty="0"/>
               <a:t>Etc.</a:t>
             </a:r>
           </a:p>
@@ -13607,7 +13600,7 @@
           <a:lstStyle/>
           <a:p>
             <a:r>
-              <a:rPr lang="en-US" dirty="0"/>
+              <a:rPr lang="en-US" sz="3200" dirty="0"/>
               <a:t>Database Design</a:t>
             </a:r>
           </a:p>
@@ -15029,21 +15022,21 @@
 </file>
 
 <file path=customXml/item2.xml><?xml version="1.0" encoding="utf-8"?>
+<?mso-contentType ?>
+<FormTemplates xmlns="http://schemas.microsoft.com/sharepoint/v3/contenttype/forms">
+  <Display>DocumentLibraryForm</Display>
+  <Edit>DocumentLibraryForm</Edit>
+  <New>DocumentLibraryForm</New>
+</FormTemplates>
+</file>
+
+<file path=customXml/item3.xml><?xml version="1.0" encoding="utf-8"?>
 <p:properties xmlns:p="http://schemas.microsoft.com/office/2006/metadata/properties" xmlns:xsi="http://www.w3.org/2001/XMLSchema-instance" xmlns:pc="http://schemas.microsoft.com/office/infopath/2007/PartnerControls">
   <documentManagement>
     <Status xmlns="71af3243-3dd4-4a8d-8c0d-dd76da1f02a5">Not started</Status>
     <MediaServiceKeyPoints xmlns="71af3243-3dd4-4a8d-8c0d-dd76da1f02a5" xsi:nil="true"/>
   </documentManagement>
 </p:properties>
-</file>
-
-<file path=customXml/item3.xml><?xml version="1.0" encoding="utf-8"?>
-<?mso-contentType ?>
-<FormTemplates xmlns="http://schemas.microsoft.com/sharepoint/v3/contenttype/forms">
-  <Display>DocumentLibraryForm</Display>
-  <Edit>DocumentLibraryForm</Edit>
-  <New>DocumentLibraryForm</New>
-</FormTemplates>
 </file>
 
 <file path=customXml/itemProps1.xml><?xml version="1.0" encoding="utf-8"?>
@@ -15066,6 +15059,14 @@
 </file>
 
 <file path=customXml/itemProps2.xml><?xml version="1.0" encoding="utf-8"?>
+<ds:datastoreItem xmlns:ds="http://schemas.openxmlformats.org/officeDocument/2006/customXml" ds:itemID="{26A0F1FB-B1B3-48EC-BFEE-FC0094A34C28}">
+  <ds:schemaRefs>
+    <ds:schemaRef ds:uri="http://schemas.microsoft.com/sharepoint/v3/contenttype/forms"/>
+  </ds:schemaRefs>
+</ds:datastoreItem>
+</file>
+
+<file path=customXml/itemProps3.xml><?xml version="1.0" encoding="utf-8"?>
 <ds:datastoreItem xmlns:ds="http://schemas.openxmlformats.org/officeDocument/2006/customXml" ds:itemID="{471340EA-4D3D-470F-B5D6-C0F623079401}">
   <ds:schemaRefs>
     <ds:schemaRef ds:uri="http://schemas.microsoft.com/office/2006/metadata/properties"/>
@@ -15073,12 +15074,4 @@
     <ds:schemaRef ds:uri="71af3243-3dd4-4a8d-8c0d-dd76da1f02a5"/>
   </ds:schemaRefs>
 </ds:datastoreItem>
-</file>
-
-<file path=customXml/itemProps3.xml><?xml version="1.0" encoding="utf-8"?>
-<ds:datastoreItem xmlns:ds="http://schemas.openxmlformats.org/officeDocument/2006/customXml" ds:itemID="{26A0F1FB-B1B3-48EC-BFEE-FC0094A34C28}">
-  <ds:schemaRefs>
-    <ds:schemaRef ds:uri="http://schemas.microsoft.com/sharepoint/v3/contenttype/forms"/>
-  </ds:schemaRefs>
-</ds:datastoreItem>
 </file>
</xml_diff>